<commit_message>
V2.0 (beta) with new features
This version introduces the resume feature and up to 10 times undo usage before labeling a new peak. The detailed info about new resume feature is in UserGuide4etalonCountingAPP.pptx.
</commit_message>
<xml_diff>
--- a/UserGuide4etalonCountingAPP.pptx
+++ b/UserGuide4etalonCountingAPP.pptx
@@ -19,6 +19,7 @@
     <p:sldId id="267" r:id="rId13"/>
     <p:sldId id="268" r:id="rId14"/>
     <p:sldId id="269" r:id="rId15"/>
+    <p:sldId id="270" r:id="rId16"/>
   </p:sldIdLst>
   <p:sldSz cx="9144000" cy="6858000" type="screen4x3"/>
   <p:notesSz cx="6858000" cy="9144000"/>
@@ -117,6 +118,11 @@
       </a:defRPr>
     </a:lvl9pPr>
   </p:defaultTextStyle>
+  <p:extLst>
+    <p:ext uri="{EFAFB233-063F-42B5-8137-9DF3F51BA10A}">
+      <p15:sldGuideLst xmlns:p15="http://schemas.microsoft.com/office/powerpoint/2012/main"/>
+    </p:ext>
+  </p:extLst>
 </p:presentation>
 </file>
 
@@ -993,7 +999,7 @@
           <a:p>
             <a:fld id="{D4D9735A-38B7-8B4A-8B5E-B0FC9C9077BB}" type="datetimeFigureOut">
               <a:rPr kumimoji="1" lang="zh-CN" altLang="en-US" smtClean="0"/>
-              <a:t>2021/4/29</a:t>
+              <a:t>2022/5/20</a:t>
             </a:fld>
             <a:endParaRPr kumimoji="1" lang="zh-CN" altLang="en-US"/>
           </a:p>
@@ -1163,7 +1169,7 @@
           <a:p>
             <a:fld id="{D4D9735A-38B7-8B4A-8B5E-B0FC9C9077BB}" type="datetimeFigureOut">
               <a:rPr kumimoji="1" lang="zh-CN" altLang="en-US" smtClean="0"/>
-              <a:t>2021/4/29</a:t>
+              <a:t>2022/5/20</a:t>
             </a:fld>
             <a:endParaRPr kumimoji="1" lang="zh-CN" altLang="en-US"/>
           </a:p>
@@ -1343,7 +1349,7 @@
           <a:p>
             <a:fld id="{D4D9735A-38B7-8B4A-8B5E-B0FC9C9077BB}" type="datetimeFigureOut">
               <a:rPr kumimoji="1" lang="zh-CN" altLang="en-US" smtClean="0"/>
-              <a:t>2021/4/29</a:t>
+              <a:t>2022/5/20</a:t>
             </a:fld>
             <a:endParaRPr kumimoji="1" lang="zh-CN" altLang="en-US"/>
           </a:p>
@@ -1513,7 +1519,7 @@
           <a:p>
             <a:fld id="{D4D9735A-38B7-8B4A-8B5E-B0FC9C9077BB}" type="datetimeFigureOut">
               <a:rPr kumimoji="1" lang="zh-CN" altLang="en-US" smtClean="0"/>
-              <a:t>2021/4/29</a:t>
+              <a:t>2022/5/20</a:t>
             </a:fld>
             <a:endParaRPr kumimoji="1" lang="zh-CN" altLang="en-US"/>
           </a:p>
@@ -1757,7 +1763,7 @@
           <a:p>
             <a:fld id="{D4D9735A-38B7-8B4A-8B5E-B0FC9C9077BB}" type="datetimeFigureOut">
               <a:rPr kumimoji="1" lang="zh-CN" altLang="en-US" smtClean="0"/>
-              <a:t>2021/4/29</a:t>
+              <a:t>2022/5/20</a:t>
             </a:fld>
             <a:endParaRPr kumimoji="1" lang="zh-CN" altLang="en-US"/>
           </a:p>
@@ -1989,7 +1995,7 @@
           <a:p>
             <a:fld id="{D4D9735A-38B7-8B4A-8B5E-B0FC9C9077BB}" type="datetimeFigureOut">
               <a:rPr kumimoji="1" lang="zh-CN" altLang="en-US" smtClean="0"/>
-              <a:t>2021/4/29</a:t>
+              <a:t>2022/5/20</a:t>
             </a:fld>
             <a:endParaRPr kumimoji="1" lang="zh-CN" altLang="en-US"/>
           </a:p>
@@ -2356,7 +2362,7 @@
           <a:p>
             <a:fld id="{D4D9735A-38B7-8B4A-8B5E-B0FC9C9077BB}" type="datetimeFigureOut">
               <a:rPr kumimoji="1" lang="zh-CN" altLang="en-US" smtClean="0"/>
-              <a:t>2021/4/29</a:t>
+              <a:t>2022/5/20</a:t>
             </a:fld>
             <a:endParaRPr kumimoji="1" lang="zh-CN" altLang="en-US"/>
           </a:p>
@@ -2474,7 +2480,7 @@
           <a:p>
             <a:fld id="{D4D9735A-38B7-8B4A-8B5E-B0FC9C9077BB}" type="datetimeFigureOut">
               <a:rPr kumimoji="1" lang="zh-CN" altLang="en-US" smtClean="0"/>
-              <a:t>2021/4/29</a:t>
+              <a:t>2022/5/20</a:t>
             </a:fld>
             <a:endParaRPr kumimoji="1" lang="zh-CN" altLang="en-US"/>
           </a:p>
@@ -2569,7 +2575,7 @@
           <a:p>
             <a:fld id="{D4D9735A-38B7-8B4A-8B5E-B0FC9C9077BB}" type="datetimeFigureOut">
               <a:rPr kumimoji="1" lang="zh-CN" altLang="en-US" smtClean="0"/>
-              <a:t>2021/4/29</a:t>
+              <a:t>2022/5/20</a:t>
             </a:fld>
             <a:endParaRPr kumimoji="1" lang="zh-CN" altLang="en-US"/>
           </a:p>
@@ -2846,7 +2852,7 @@
           <a:p>
             <a:fld id="{D4D9735A-38B7-8B4A-8B5E-B0FC9C9077BB}" type="datetimeFigureOut">
               <a:rPr kumimoji="1" lang="zh-CN" altLang="en-US" smtClean="0"/>
-              <a:t>2021/4/29</a:t>
+              <a:t>2022/5/20</a:t>
             </a:fld>
             <a:endParaRPr kumimoji="1" lang="zh-CN" altLang="en-US"/>
           </a:p>
@@ -3103,7 +3109,7 @@
           <a:p>
             <a:fld id="{D4D9735A-38B7-8B4A-8B5E-B0FC9C9077BB}" type="datetimeFigureOut">
               <a:rPr kumimoji="1" lang="zh-CN" altLang="en-US" smtClean="0"/>
-              <a:t>2021/4/29</a:t>
+              <a:t>2022/5/20</a:t>
             </a:fld>
             <a:endParaRPr kumimoji="1" lang="zh-CN" altLang="en-US"/>
           </a:p>
@@ -3316,7 +3322,7 @@
           <a:p>
             <a:fld id="{D4D9735A-38B7-8B4A-8B5E-B0FC9C9077BB}" type="datetimeFigureOut">
               <a:rPr kumimoji="1" lang="zh-CN" altLang="en-US" smtClean="0"/>
-              <a:t>2021/4/29</a:t>
+              <a:t>2022/5/20</a:t>
             </a:fld>
             <a:endParaRPr kumimoji="1" lang="zh-CN" altLang="en-US"/>
           </a:p>
@@ -4595,7 +4601,7 @@
             <a:pPr algn="just"/>
             <a:r>
               <a:rPr kumimoji="1" lang="en-US" altLang="zh-CN" sz="1600" dirty="0"/>
-              <a:t>You can always use “Undo” to withdraw your last action. This action can be used only one time after recording new peaks. Control + Z or Command + Z shortcuts are also supported. For keyboard shortcuts, you can also use direction key ⬆️⬇️⬅️➡️ to click “Up!”, “Down!”, “No change” and “I don’t want this one”. Use these shortcuts after you click on any empty area of this window to avoid selecting any buttons or boxes.</a:t>
+              <a:t>You can always use “Undo” to withdraw your last action. This action can be used only 10 times (in v2.0) after recording new peaks. Control + Z or Command + Z shortcuts are also supported. For keyboard shortcuts, you can also use direction key ⬆️⬇️⬅️➡️ to click “Up!”, “Down!”, “No change” and “I don’t want this one”. Use these shortcuts after you click on any empty area of this window to avoid selecting any buttons or boxes.</a:t>
             </a:r>
             <a:endParaRPr kumimoji="1" lang="zh-CN" altLang="en-US" sz="1600" dirty="0"/>
           </a:p>
@@ -4929,6 +4935,276 @@
     <p:extLst>
       <p:ext uri="{BB962C8B-B14F-4D97-AF65-F5344CB8AC3E}">
         <p14:creationId xmlns:p14="http://schemas.microsoft.com/office/powerpoint/2010/main" val="1079446820"/>
+      </p:ext>
+    </p:extLst>
+  </p:cSld>
+  <p:clrMapOvr>
+    <a:masterClrMapping/>
+  </p:clrMapOvr>
+</p:sld>
+</file>
+
+<file path=ppt/slides/slide15.xml><?xml version="1.0" encoding="utf-8"?>
+<p:sld xmlns:a="http://schemas.openxmlformats.org/drawingml/2006/main" xmlns:r="http://schemas.openxmlformats.org/officeDocument/2006/relationships" xmlns:p="http://schemas.openxmlformats.org/presentationml/2006/main">
+  <p:cSld>
+    <p:spTree>
+      <p:nvGrpSpPr>
+        <p:cNvPr id="1" name=""/>
+        <p:cNvGrpSpPr/>
+        <p:nvPr/>
+      </p:nvGrpSpPr>
+      <p:grpSpPr>
+        <a:xfrm>
+          <a:off x="0" y="0"/>
+          <a:ext cx="0" cy="0"/>
+          <a:chOff x="0" y="0"/>
+          <a:chExt cx="0" cy="0"/>
+        </a:xfrm>
+      </p:grpSpPr>
+      <p:sp>
+        <p:nvSpPr>
+          <p:cNvPr id="2" name="标题 1">
+            <a:extLst>
+              <a:ext uri="{FF2B5EF4-FFF2-40B4-BE49-F238E27FC236}">
+                <a16:creationId xmlns:a16="http://schemas.microsoft.com/office/drawing/2014/main" id="{0DDC1D84-DFDF-AE4C-A54A-28D406858873}"/>
+              </a:ext>
+            </a:extLst>
+          </p:cNvPr>
+          <p:cNvSpPr>
+            <a:spLocks noGrp="1"/>
+          </p:cNvSpPr>
+          <p:nvPr>
+            <p:ph type="title"/>
+          </p:nvPr>
+        </p:nvSpPr>
+        <p:spPr/>
+        <p:txBody>
+          <a:bodyPr/>
+          <a:lstStyle/>
+          <a:p>
+            <a:r>
+              <a:rPr kumimoji="1" lang="en-US" altLang="zh-CN" dirty="0"/>
+              <a:t>Features in v2.0 beta</a:t>
+            </a:r>
+            <a:endParaRPr kumimoji="1" lang="zh-CN" altLang="en-US" dirty="0"/>
+          </a:p>
+        </p:txBody>
+      </p:sp>
+      <p:sp>
+        <p:nvSpPr>
+          <p:cNvPr id="7" name="文本框 6">
+            <a:extLst>
+              <a:ext uri="{FF2B5EF4-FFF2-40B4-BE49-F238E27FC236}">
+                <a16:creationId xmlns:a16="http://schemas.microsoft.com/office/drawing/2014/main" id="{A0A8893B-C275-1546-AFF5-58628BBFBDB7}"/>
+              </a:ext>
+            </a:extLst>
+          </p:cNvPr>
+          <p:cNvSpPr txBox="1"/>
+          <p:nvPr/>
+        </p:nvSpPr>
+        <p:spPr>
+          <a:xfrm>
+            <a:off x="628650" y="1400031"/>
+            <a:ext cx="7886700" cy="1938992"/>
+          </a:xfrm>
+          <a:prstGeom prst="rect">
+            <a:avLst/>
+          </a:prstGeom>
+          <a:noFill/>
+        </p:spPr>
+        <p:txBody>
+          <a:bodyPr wrap="square" rtlCol="0">
+            <a:spAutoFit/>
+          </a:bodyPr>
+          <a:lstStyle/>
+          <a:p>
+            <a:pPr algn="just"/>
+            <a:r>
+              <a:rPr kumimoji="1" lang="en-US" altLang="zh-CN" sz="2000" dirty="0"/>
+              <a:t>When you are loading etalon data files processed by </a:t>
+            </a:r>
+            <a:r>
+              <a:rPr kumimoji="1" lang="en-US" altLang="zh-CN" sz="2000" dirty="0" err="1"/>
+              <a:t>pre_process.m</a:t>
+            </a:r>
+            <a:r>
+              <a:rPr kumimoji="1" lang="en-US" altLang="zh-CN" sz="2000" dirty="0"/>
+              <a:t>, the app will check if there is a </a:t>
+            </a:r>
+            <a:r>
+              <a:rPr kumimoji="1" lang="en-US" altLang="zh-CN" sz="2000" dirty="0" err="1"/>
+              <a:t>results.mat</a:t>
+            </a:r>
+            <a:r>
+              <a:rPr kumimoji="1" lang="en-US" altLang="zh-CN" sz="2000" dirty="0"/>
+              <a:t> existed in the directory of etalon data file (in this case is “</a:t>
+            </a:r>
+            <a:r>
+              <a:rPr kumimoji="1" lang="en-US" altLang="zh-CN" sz="2000" dirty="0" err="1"/>
+              <a:t>scan_time_etalon.mat</a:t>
+            </a:r>
+            <a:r>
+              <a:rPr kumimoji="1" lang="en-US" altLang="zh-CN" sz="2000" dirty="0"/>
+              <a:t>”). If it exist, the app will ask if you want to continue your last work. Press “Yes” and the app will get back from where you saved in “</a:t>
+            </a:r>
+            <a:r>
+              <a:rPr kumimoji="1" lang="en-US" altLang="zh-CN" sz="2000" dirty="0" err="1"/>
+              <a:t>results.mat</a:t>
+            </a:r>
+            <a:r>
+              <a:rPr kumimoji="1" lang="en-US" altLang="zh-CN" sz="2000" dirty="0"/>
+              <a:t>”. This feature only available on “</a:t>
+            </a:r>
+            <a:r>
+              <a:rPr kumimoji="1" lang="en-US" altLang="zh-CN" sz="2000" dirty="0" err="1"/>
+              <a:t>results.mat</a:t>
+            </a:r>
+            <a:r>
+              <a:rPr kumimoji="1" lang="en-US" altLang="zh-CN" sz="2000" dirty="0"/>
+              <a:t>” generated by v2.0 of this app.</a:t>
+            </a:r>
+            <a:endParaRPr kumimoji="1" lang="zh-CN" altLang="en-US" sz="2000" dirty="0"/>
+          </a:p>
+        </p:txBody>
+      </p:sp>
+      <p:pic>
+        <p:nvPicPr>
+          <p:cNvPr id="3" name="图片 2">
+            <a:extLst>
+              <a:ext uri="{FF2B5EF4-FFF2-40B4-BE49-F238E27FC236}">
+                <a16:creationId xmlns:a16="http://schemas.microsoft.com/office/drawing/2014/main" id="{9B69654F-624B-CBD6-575D-5223EA0E66D7}"/>
+              </a:ext>
+            </a:extLst>
+          </p:cNvPr>
+          <p:cNvPicPr>
+            <a:picLocks noChangeAspect="1"/>
+          </p:cNvPicPr>
+          <p:nvPr/>
+        </p:nvPicPr>
+        <p:blipFill>
+          <a:blip r:embed="rId2"/>
+          <a:stretch>
+            <a:fillRect/>
+          </a:stretch>
+        </p:blipFill>
+        <p:spPr>
+          <a:xfrm>
+            <a:off x="3062563" y="3444610"/>
+            <a:ext cx="6591957" cy="3048264"/>
+          </a:xfrm>
+          <a:prstGeom prst="rect">
+            <a:avLst/>
+          </a:prstGeom>
+        </p:spPr>
+      </p:pic>
+      <p:pic>
+        <p:nvPicPr>
+          <p:cNvPr id="6" name="图片 5">
+            <a:extLst>
+              <a:ext uri="{FF2B5EF4-FFF2-40B4-BE49-F238E27FC236}">
+                <a16:creationId xmlns:a16="http://schemas.microsoft.com/office/drawing/2014/main" id="{E7F835B8-369D-DEBB-A202-3A5C1F65CE55}"/>
+              </a:ext>
+            </a:extLst>
+          </p:cNvPr>
+          <p:cNvPicPr>
+            <a:picLocks noChangeAspect="1"/>
+          </p:cNvPicPr>
+          <p:nvPr/>
+        </p:nvPicPr>
+        <p:blipFill>
+          <a:blip r:embed="rId3"/>
+          <a:stretch>
+            <a:fillRect/>
+          </a:stretch>
+        </p:blipFill>
+        <p:spPr>
+          <a:xfrm>
+            <a:off x="321660" y="3907861"/>
+            <a:ext cx="2463800" cy="546100"/>
+          </a:xfrm>
+          <a:prstGeom prst="rect">
+            <a:avLst/>
+          </a:prstGeom>
+        </p:spPr>
+      </p:pic>
+      <p:sp>
+        <p:nvSpPr>
+          <p:cNvPr id="10" name="文本框 9">
+            <a:extLst>
+              <a:ext uri="{FF2B5EF4-FFF2-40B4-BE49-F238E27FC236}">
+                <a16:creationId xmlns:a16="http://schemas.microsoft.com/office/drawing/2014/main" id="{4B28A012-C363-027F-4023-1505B165F9E4}"/>
+              </a:ext>
+            </a:extLst>
+          </p:cNvPr>
+          <p:cNvSpPr txBox="1"/>
+          <p:nvPr/>
+        </p:nvSpPr>
+        <p:spPr>
+          <a:xfrm>
+            <a:off x="477892" y="4453961"/>
+            <a:ext cx="2151336" cy="407001"/>
+          </a:xfrm>
+          <a:prstGeom prst="rect">
+            <a:avLst/>
+          </a:prstGeom>
+          <a:noFill/>
+        </p:spPr>
+        <p:txBody>
+          <a:bodyPr wrap="square" rtlCol="0">
+            <a:spAutoFit/>
+          </a:bodyPr>
+          <a:lstStyle/>
+          <a:p>
+            <a:pPr algn="just"/>
+            <a:r>
+              <a:rPr kumimoji="1" lang="en-US" altLang="zh-CN" sz="2000" dirty="0"/>
+              <a:t>In same directory</a:t>
+            </a:r>
+            <a:endParaRPr kumimoji="1" lang="zh-CN" altLang="en-US" sz="2000" dirty="0"/>
+          </a:p>
+        </p:txBody>
+      </p:sp>
+      <p:sp>
+        <p:nvSpPr>
+          <p:cNvPr id="11" name="文本框 10">
+            <a:extLst>
+              <a:ext uri="{FF2B5EF4-FFF2-40B4-BE49-F238E27FC236}">
+                <a16:creationId xmlns:a16="http://schemas.microsoft.com/office/drawing/2014/main" id="{210CAB0D-D74E-4BB4-4359-13F18FBBCB79}"/>
+              </a:ext>
+            </a:extLst>
+          </p:cNvPr>
+          <p:cNvSpPr txBox="1"/>
+          <p:nvPr/>
+        </p:nvSpPr>
+        <p:spPr>
+          <a:xfrm>
+            <a:off x="5053343" y="6463145"/>
+            <a:ext cx="2610396" cy="400110"/>
+          </a:xfrm>
+          <a:prstGeom prst="rect">
+            <a:avLst/>
+          </a:prstGeom>
+          <a:noFill/>
+        </p:spPr>
+        <p:txBody>
+          <a:bodyPr wrap="square" rtlCol="0">
+            <a:spAutoFit/>
+          </a:bodyPr>
+          <a:lstStyle/>
+          <a:p>
+            <a:pPr algn="just"/>
+            <a:r>
+              <a:rPr kumimoji="1" lang="en-US" altLang="zh-CN" sz="2000" dirty="0"/>
+              <a:t>New confirm window</a:t>
+            </a:r>
+            <a:endParaRPr kumimoji="1" lang="zh-CN" altLang="en-US" sz="2000" dirty="0"/>
+          </a:p>
+        </p:txBody>
+      </p:sp>
+    </p:spTree>
+    <p:extLst>
+      <p:ext uri="{BB962C8B-B14F-4D97-AF65-F5344CB8AC3E}">
+        <p14:creationId xmlns:p14="http://schemas.microsoft.com/office/powerpoint/2010/main" val="1503729013"/>
       </p:ext>
     </p:extLst>
   </p:cSld>
@@ -7255,8 +7531,8 @@
             <a:chExt cx="1045080" cy="773280"/>
           </a:xfrm>
         </p:grpSpPr>
-        <mc:AlternateContent xmlns:mc="http://schemas.openxmlformats.org/markup-compatibility/2006">
-          <mc:Choice xmlns:p14="http://schemas.microsoft.com/office/powerpoint/2010/main" Requires="p14">
+        <mc:AlternateContent xmlns:mc="http://schemas.openxmlformats.org/markup-compatibility/2006" xmlns:p14="http://schemas.microsoft.com/office/powerpoint/2010/main">
+          <mc:Choice Requires="p14">
             <p:contentPart p14:bwMode="auto" r:id="rId3">
               <p14:nvContentPartPr>
                 <p14:cNvPr id="11" name="墨迹 10">
@@ -7275,7 +7551,7 @@
               </p14:xfrm>
             </p:contentPart>
           </mc:Choice>
-          <mc:Fallback>
+          <mc:Fallback xmlns="">
             <p:pic>
               <p:nvPicPr>
                 <p:cNvPr id="11" name="墨迹 10">
@@ -7306,8 +7582,8 @@
             </p:pic>
           </mc:Fallback>
         </mc:AlternateContent>
-        <mc:AlternateContent xmlns:mc="http://schemas.openxmlformats.org/markup-compatibility/2006">
-          <mc:Choice xmlns:p14="http://schemas.microsoft.com/office/powerpoint/2010/main" Requires="p14">
+        <mc:AlternateContent xmlns:mc="http://schemas.openxmlformats.org/markup-compatibility/2006" xmlns:p14="http://schemas.microsoft.com/office/powerpoint/2010/main">
+          <mc:Choice Requires="p14">
             <p:contentPart p14:bwMode="auto" r:id="rId5">
               <p14:nvContentPartPr>
                 <p14:cNvPr id="12" name="墨迹 11">
@@ -7326,7 +7602,7 @@
               </p14:xfrm>
             </p:contentPart>
           </mc:Choice>
-          <mc:Fallback>
+          <mc:Fallback xmlns="">
             <p:pic>
               <p:nvPicPr>
                 <p:cNvPr id="12" name="墨迹 11">
@@ -7357,8 +7633,8 @@
             </p:pic>
           </mc:Fallback>
         </mc:AlternateContent>
-        <mc:AlternateContent xmlns:mc="http://schemas.openxmlformats.org/markup-compatibility/2006">
-          <mc:Choice xmlns:p14="http://schemas.microsoft.com/office/powerpoint/2010/main" Requires="p14">
+        <mc:AlternateContent xmlns:mc="http://schemas.openxmlformats.org/markup-compatibility/2006" xmlns:p14="http://schemas.microsoft.com/office/powerpoint/2010/main">
+          <mc:Choice Requires="p14">
             <p:contentPart p14:bwMode="auto" r:id="rId7">
               <p14:nvContentPartPr>
                 <p14:cNvPr id="13" name="墨迹 12">
@@ -7377,7 +7653,7 @@
               </p14:xfrm>
             </p:contentPart>
           </mc:Choice>
-          <mc:Fallback>
+          <mc:Fallback xmlns="">
             <p:pic>
               <p:nvPicPr>
                 <p:cNvPr id="13" name="墨迹 12">
@@ -7429,8 +7705,8 @@
             <a:chExt cx="644040" cy="559440"/>
           </a:xfrm>
         </p:grpSpPr>
-        <mc:AlternateContent xmlns:mc="http://schemas.openxmlformats.org/markup-compatibility/2006">
-          <mc:Choice xmlns:p14="http://schemas.microsoft.com/office/powerpoint/2010/main" Requires="p14">
+        <mc:AlternateContent xmlns:mc="http://schemas.openxmlformats.org/markup-compatibility/2006" xmlns:p14="http://schemas.microsoft.com/office/powerpoint/2010/main">
+          <mc:Choice Requires="p14">
             <p:contentPart p14:bwMode="auto" r:id="rId9">
               <p14:nvContentPartPr>
                 <p14:cNvPr id="16" name="墨迹 15">
@@ -7449,7 +7725,7 @@
               </p14:xfrm>
             </p:contentPart>
           </mc:Choice>
-          <mc:Fallback>
+          <mc:Fallback xmlns="">
             <p:pic>
               <p:nvPicPr>
                 <p:cNvPr id="16" name="墨迹 15">
@@ -7480,8 +7756,8 @@
             </p:pic>
           </mc:Fallback>
         </mc:AlternateContent>
-        <mc:AlternateContent xmlns:mc="http://schemas.openxmlformats.org/markup-compatibility/2006">
-          <mc:Choice xmlns:p14="http://schemas.microsoft.com/office/powerpoint/2010/main" Requires="p14">
+        <mc:AlternateContent xmlns:mc="http://schemas.openxmlformats.org/markup-compatibility/2006" xmlns:p14="http://schemas.microsoft.com/office/powerpoint/2010/main">
+          <mc:Choice Requires="p14">
             <p:contentPart p14:bwMode="auto" r:id="rId11">
               <p14:nvContentPartPr>
                 <p14:cNvPr id="17" name="墨迹 16">
@@ -7500,7 +7776,7 @@
               </p14:xfrm>
             </p:contentPart>
           </mc:Choice>
-          <mc:Fallback>
+          <mc:Fallback xmlns="">
             <p:pic>
               <p:nvPicPr>
                 <p:cNvPr id="17" name="墨迹 16">
@@ -7531,8 +7807,8 @@
             </p:pic>
           </mc:Fallback>
         </mc:AlternateContent>
-        <mc:AlternateContent xmlns:mc="http://schemas.openxmlformats.org/markup-compatibility/2006">
-          <mc:Choice xmlns:p14="http://schemas.microsoft.com/office/powerpoint/2010/main" Requires="p14">
+        <mc:AlternateContent xmlns:mc="http://schemas.openxmlformats.org/markup-compatibility/2006" xmlns:p14="http://schemas.microsoft.com/office/powerpoint/2010/main">
+          <mc:Choice Requires="p14">
             <p:contentPart p14:bwMode="auto" r:id="rId13">
               <p14:nvContentPartPr>
                 <p14:cNvPr id="18" name="墨迹 17">
@@ -7551,7 +7827,7 @@
               </p14:xfrm>
             </p:contentPart>
           </mc:Choice>
-          <mc:Fallback>
+          <mc:Fallback xmlns="">
             <p:pic>
               <p:nvPicPr>
                 <p:cNvPr id="18" name="墨迹 17">
@@ -7603,8 +7879,8 @@
             <a:chExt cx="722880" cy="898200"/>
           </a:xfrm>
         </p:grpSpPr>
-        <mc:AlternateContent xmlns:mc="http://schemas.openxmlformats.org/markup-compatibility/2006">
-          <mc:Choice xmlns:p14="http://schemas.microsoft.com/office/powerpoint/2010/main" Requires="p14">
+        <mc:AlternateContent xmlns:mc="http://schemas.openxmlformats.org/markup-compatibility/2006" xmlns:p14="http://schemas.microsoft.com/office/powerpoint/2010/main">
+          <mc:Choice Requires="p14">
             <p:contentPart p14:bwMode="auto" r:id="rId15">
               <p14:nvContentPartPr>
                 <p14:cNvPr id="24" name="墨迹 23">
@@ -7623,7 +7899,7 @@
               </p14:xfrm>
             </p:contentPart>
           </mc:Choice>
-          <mc:Fallback>
+          <mc:Fallback xmlns="">
             <p:pic>
               <p:nvPicPr>
                 <p:cNvPr id="24" name="墨迹 23">
@@ -7654,8 +7930,8 @@
             </p:pic>
           </mc:Fallback>
         </mc:AlternateContent>
-        <mc:AlternateContent xmlns:mc="http://schemas.openxmlformats.org/markup-compatibility/2006">
-          <mc:Choice xmlns:p14="http://schemas.microsoft.com/office/powerpoint/2010/main" Requires="p14">
+        <mc:AlternateContent xmlns:mc="http://schemas.openxmlformats.org/markup-compatibility/2006" xmlns:p14="http://schemas.microsoft.com/office/powerpoint/2010/main">
+          <mc:Choice Requires="p14">
             <p:contentPart p14:bwMode="auto" r:id="rId17">
               <p14:nvContentPartPr>
                 <p14:cNvPr id="25" name="墨迹 24">
@@ -7674,7 +7950,7 @@
               </p14:xfrm>
             </p:contentPart>
           </mc:Choice>
-          <mc:Fallback>
+          <mc:Fallback xmlns="">
             <p:pic>
               <p:nvPicPr>
                 <p:cNvPr id="25" name="墨迹 24">
@@ -7705,8 +7981,8 @@
             </p:pic>
           </mc:Fallback>
         </mc:AlternateContent>
-        <mc:AlternateContent xmlns:mc="http://schemas.openxmlformats.org/markup-compatibility/2006">
-          <mc:Choice xmlns:p14="http://schemas.microsoft.com/office/powerpoint/2010/main" Requires="p14">
+        <mc:AlternateContent xmlns:mc="http://schemas.openxmlformats.org/markup-compatibility/2006" xmlns:p14="http://schemas.microsoft.com/office/powerpoint/2010/main">
+          <mc:Choice Requires="p14">
             <p:contentPart p14:bwMode="auto" r:id="rId19">
               <p14:nvContentPartPr>
                 <p14:cNvPr id="26" name="墨迹 25">
@@ -7725,7 +8001,7 @@
               </p14:xfrm>
             </p:contentPart>
           </mc:Choice>
-          <mc:Fallback>
+          <mc:Fallback xmlns="">
             <p:pic>
               <p:nvPicPr>
                 <p:cNvPr id="26" name="墨迹 25">
@@ -7756,8 +8032,8 @@
             </p:pic>
           </mc:Fallback>
         </mc:AlternateContent>
-        <mc:AlternateContent xmlns:mc="http://schemas.openxmlformats.org/markup-compatibility/2006">
-          <mc:Choice xmlns:p14="http://schemas.microsoft.com/office/powerpoint/2010/main" Requires="p14">
+        <mc:AlternateContent xmlns:mc="http://schemas.openxmlformats.org/markup-compatibility/2006" xmlns:p14="http://schemas.microsoft.com/office/powerpoint/2010/main">
+          <mc:Choice Requires="p14">
             <p:contentPart p14:bwMode="auto" r:id="rId21">
               <p14:nvContentPartPr>
                 <p14:cNvPr id="28" name="墨迹 27">
@@ -7776,7 +8052,7 @@
               </p14:xfrm>
             </p:contentPart>
           </mc:Choice>
-          <mc:Fallback>
+          <mc:Fallback xmlns="">
             <p:pic>
               <p:nvPicPr>
                 <p:cNvPr id="28" name="墨迹 27">
@@ -7828,8 +8104,8 @@
             <a:chExt cx="1117800" cy="395640"/>
           </a:xfrm>
         </p:grpSpPr>
-        <mc:AlternateContent xmlns:mc="http://schemas.openxmlformats.org/markup-compatibility/2006">
-          <mc:Choice xmlns:p14="http://schemas.microsoft.com/office/powerpoint/2010/main" Requires="p14">
+        <mc:AlternateContent xmlns:mc="http://schemas.openxmlformats.org/markup-compatibility/2006" xmlns:p14="http://schemas.microsoft.com/office/powerpoint/2010/main">
+          <mc:Choice Requires="p14">
             <p:contentPart p14:bwMode="auto" r:id="rId23">
               <p14:nvContentPartPr>
                 <p14:cNvPr id="20" name="墨迹 19">
@@ -7848,7 +8124,7 @@
               </p14:xfrm>
             </p:contentPart>
           </mc:Choice>
-          <mc:Fallback>
+          <mc:Fallback xmlns="">
             <p:pic>
               <p:nvPicPr>
                 <p:cNvPr id="20" name="墨迹 19">
@@ -7879,8 +8155,8 @@
             </p:pic>
           </mc:Fallback>
         </mc:AlternateContent>
-        <mc:AlternateContent xmlns:mc="http://schemas.openxmlformats.org/markup-compatibility/2006">
-          <mc:Choice xmlns:p14="http://schemas.microsoft.com/office/powerpoint/2010/main" Requires="p14">
+        <mc:AlternateContent xmlns:mc="http://schemas.openxmlformats.org/markup-compatibility/2006" xmlns:p14="http://schemas.microsoft.com/office/powerpoint/2010/main">
+          <mc:Choice Requires="p14">
             <p:contentPart p14:bwMode="auto" r:id="rId25">
               <p14:nvContentPartPr>
                 <p14:cNvPr id="21" name="墨迹 20">
@@ -7899,7 +8175,7 @@
               </p14:xfrm>
             </p:contentPart>
           </mc:Choice>
-          <mc:Fallback>
+          <mc:Fallback xmlns="">
             <p:pic>
               <p:nvPicPr>
                 <p:cNvPr id="21" name="墨迹 20">
@@ -7930,8 +8206,8 @@
             </p:pic>
           </mc:Fallback>
         </mc:AlternateContent>
-        <mc:AlternateContent xmlns:mc="http://schemas.openxmlformats.org/markup-compatibility/2006">
-          <mc:Choice xmlns:p14="http://schemas.microsoft.com/office/powerpoint/2010/main" Requires="p14">
+        <mc:AlternateContent xmlns:mc="http://schemas.openxmlformats.org/markup-compatibility/2006" xmlns:p14="http://schemas.microsoft.com/office/powerpoint/2010/main">
+          <mc:Choice Requires="p14">
             <p:contentPart p14:bwMode="auto" r:id="rId27">
               <p14:nvContentPartPr>
                 <p14:cNvPr id="22" name="墨迹 21">
@@ -7950,7 +8226,7 @@
               </p14:xfrm>
             </p:contentPart>
           </mc:Choice>
-          <mc:Fallback>
+          <mc:Fallback xmlns="">
             <p:pic>
               <p:nvPicPr>
                 <p:cNvPr id="22" name="墨迹 21">
@@ -7981,8 +8257,8 @@
             </p:pic>
           </mc:Fallback>
         </mc:AlternateContent>
-        <mc:AlternateContent xmlns:mc="http://schemas.openxmlformats.org/markup-compatibility/2006">
-          <mc:Choice xmlns:p14="http://schemas.microsoft.com/office/powerpoint/2010/main" Requires="p14">
+        <mc:AlternateContent xmlns:mc="http://schemas.openxmlformats.org/markup-compatibility/2006" xmlns:p14="http://schemas.microsoft.com/office/powerpoint/2010/main">
+          <mc:Choice Requires="p14">
             <p:contentPart p14:bwMode="auto" r:id="rId29">
               <p14:nvContentPartPr>
                 <p14:cNvPr id="30" name="墨迹 29">
@@ -8001,7 +8277,7 @@
               </p14:xfrm>
             </p:contentPart>
           </mc:Choice>
-          <mc:Fallback>
+          <mc:Fallback xmlns="">
             <p:pic>
               <p:nvPicPr>
                 <p:cNvPr id="30" name="墨迹 29">
@@ -8032,8 +8308,8 @@
             </p:pic>
           </mc:Fallback>
         </mc:AlternateContent>
-        <mc:AlternateContent xmlns:mc="http://schemas.openxmlformats.org/markup-compatibility/2006">
-          <mc:Choice xmlns:p14="http://schemas.microsoft.com/office/powerpoint/2010/main" Requires="p14">
+        <mc:AlternateContent xmlns:mc="http://schemas.openxmlformats.org/markup-compatibility/2006" xmlns:p14="http://schemas.microsoft.com/office/powerpoint/2010/main">
+          <mc:Choice Requires="p14">
             <p:contentPart p14:bwMode="auto" r:id="rId31">
               <p14:nvContentPartPr>
                 <p14:cNvPr id="31" name="墨迹 30">
@@ -8052,7 +8328,7 @@
               </p14:xfrm>
             </p:contentPart>
           </mc:Choice>
-          <mc:Fallback>
+          <mc:Fallback xmlns="">
             <p:pic>
               <p:nvPicPr>
                 <p:cNvPr id="31" name="墨迹 30">
@@ -8083,8 +8359,8 @@
             </p:pic>
           </mc:Fallback>
         </mc:AlternateContent>
-        <mc:AlternateContent xmlns:mc="http://schemas.openxmlformats.org/markup-compatibility/2006">
-          <mc:Choice xmlns:p14="http://schemas.microsoft.com/office/powerpoint/2010/main" Requires="p14">
+        <mc:AlternateContent xmlns:mc="http://schemas.openxmlformats.org/markup-compatibility/2006" xmlns:p14="http://schemas.microsoft.com/office/powerpoint/2010/main">
+          <mc:Choice Requires="p14">
             <p:contentPart p14:bwMode="auto" r:id="rId33">
               <p14:nvContentPartPr>
                 <p14:cNvPr id="32" name="墨迹 31">
@@ -8103,7 +8379,7 @@
               </p14:xfrm>
             </p:contentPart>
           </mc:Choice>
-          <mc:Fallback>
+          <mc:Fallback xmlns="">
             <p:pic>
               <p:nvPicPr>
                 <p:cNvPr id="32" name="墨迹 31">
@@ -8134,8 +8410,8 @@
             </p:pic>
           </mc:Fallback>
         </mc:AlternateContent>
-        <mc:AlternateContent xmlns:mc="http://schemas.openxmlformats.org/markup-compatibility/2006">
-          <mc:Choice xmlns:p14="http://schemas.microsoft.com/office/powerpoint/2010/main" Requires="p14">
+        <mc:AlternateContent xmlns:mc="http://schemas.openxmlformats.org/markup-compatibility/2006" xmlns:p14="http://schemas.microsoft.com/office/powerpoint/2010/main">
+          <mc:Choice Requires="p14">
             <p:contentPart p14:bwMode="auto" r:id="rId35">
               <p14:nvContentPartPr>
                 <p14:cNvPr id="34" name="墨迹 33">
@@ -8154,7 +8430,7 @@
               </p14:xfrm>
             </p:contentPart>
           </mc:Choice>
-          <mc:Fallback>
+          <mc:Fallback xmlns="">
             <p:pic>
               <p:nvPicPr>
                 <p:cNvPr id="34" name="墨迹 33">
@@ -8206,8 +8482,8 @@
             <a:chExt cx="831167" cy="321840"/>
           </a:xfrm>
         </p:grpSpPr>
-        <mc:AlternateContent xmlns:mc="http://schemas.openxmlformats.org/markup-compatibility/2006">
-          <mc:Choice xmlns:p14="http://schemas.microsoft.com/office/powerpoint/2010/main" Requires="p14">
+        <mc:AlternateContent xmlns:mc="http://schemas.openxmlformats.org/markup-compatibility/2006" xmlns:p14="http://schemas.microsoft.com/office/powerpoint/2010/main">
+          <mc:Choice Requires="p14">
             <p:contentPart p14:bwMode="auto" r:id="rId37">
               <p14:nvContentPartPr>
                 <p14:cNvPr id="5" name="墨迹 4">
@@ -8226,7 +8502,7 @@
               </p14:xfrm>
             </p:contentPart>
           </mc:Choice>
-          <mc:Fallback>
+          <mc:Fallback xmlns="">
             <p:pic>
               <p:nvPicPr>
                 <p:cNvPr id="5" name="墨迹 4">
@@ -8257,8 +8533,8 @@
             </p:pic>
           </mc:Fallback>
         </mc:AlternateContent>
-        <mc:AlternateContent xmlns:mc="http://schemas.openxmlformats.org/markup-compatibility/2006">
-          <mc:Choice xmlns:p14="http://schemas.microsoft.com/office/powerpoint/2010/main" Requires="p14">
+        <mc:AlternateContent xmlns:mc="http://schemas.openxmlformats.org/markup-compatibility/2006" xmlns:p14="http://schemas.microsoft.com/office/powerpoint/2010/main">
+          <mc:Choice Requires="p14">
             <p:contentPart p14:bwMode="auto" r:id="rId39">
               <p14:nvContentPartPr>
                 <p14:cNvPr id="8" name="墨迹 7">
@@ -8277,7 +8553,7 @@
               </p14:xfrm>
             </p:contentPart>
           </mc:Choice>
-          <mc:Fallback>
+          <mc:Fallback xmlns="">
             <p:pic>
               <p:nvPicPr>
                 <p:cNvPr id="8" name="墨迹 7">
@@ -8308,8 +8584,8 @@
             </p:pic>
           </mc:Fallback>
         </mc:AlternateContent>
-        <mc:AlternateContent xmlns:mc="http://schemas.openxmlformats.org/markup-compatibility/2006">
-          <mc:Choice xmlns:p14="http://schemas.microsoft.com/office/powerpoint/2010/main" Requires="p14">
+        <mc:AlternateContent xmlns:mc="http://schemas.openxmlformats.org/markup-compatibility/2006" xmlns:p14="http://schemas.microsoft.com/office/powerpoint/2010/main">
+          <mc:Choice Requires="p14">
             <p:contentPart p14:bwMode="auto" r:id="rId41">
               <p14:nvContentPartPr>
                 <p14:cNvPr id="9" name="墨迹 8">
@@ -8328,7 +8604,7 @@
               </p14:xfrm>
             </p:contentPart>
           </mc:Choice>
-          <mc:Fallback>
+          <mc:Fallback xmlns="">
             <p:pic>
               <p:nvPicPr>
                 <p:cNvPr id="9" name="墨迹 8">
@@ -8359,8 +8635,8 @@
             </p:pic>
           </mc:Fallback>
         </mc:AlternateContent>
-        <mc:AlternateContent xmlns:mc="http://schemas.openxmlformats.org/markup-compatibility/2006">
-          <mc:Choice xmlns:p14="http://schemas.microsoft.com/office/powerpoint/2010/main" Requires="p14">
+        <mc:AlternateContent xmlns:mc="http://schemas.openxmlformats.org/markup-compatibility/2006" xmlns:p14="http://schemas.microsoft.com/office/powerpoint/2010/main">
+          <mc:Choice Requires="p14">
             <p:contentPart p14:bwMode="auto" r:id="rId43">
               <p14:nvContentPartPr>
                 <p14:cNvPr id="36" name="墨迹 35">
@@ -8379,7 +8655,7 @@
               </p14:xfrm>
             </p:contentPart>
           </mc:Choice>
-          <mc:Fallback>
+          <mc:Fallback xmlns="">
             <p:pic>
               <p:nvPicPr>
                 <p:cNvPr id="36" name="墨迹 35">
@@ -8410,8 +8686,8 @@
             </p:pic>
           </mc:Fallback>
         </mc:AlternateContent>
-        <mc:AlternateContent xmlns:mc="http://schemas.openxmlformats.org/markup-compatibility/2006">
-          <mc:Choice xmlns:p14="http://schemas.microsoft.com/office/powerpoint/2010/main" Requires="p14">
+        <mc:AlternateContent xmlns:mc="http://schemas.openxmlformats.org/markup-compatibility/2006" xmlns:p14="http://schemas.microsoft.com/office/powerpoint/2010/main">
+          <mc:Choice Requires="p14">
             <p:contentPart p14:bwMode="auto" r:id="rId45">
               <p14:nvContentPartPr>
                 <p14:cNvPr id="37" name="墨迹 36">
@@ -8430,7 +8706,7 @@
               </p14:xfrm>
             </p:contentPart>
           </mc:Choice>
-          <mc:Fallback>
+          <mc:Fallback xmlns="">
             <p:pic>
               <p:nvPicPr>
                 <p:cNvPr id="37" name="墨迹 36">
@@ -8461,8 +8737,8 @@
             </p:pic>
           </mc:Fallback>
         </mc:AlternateContent>
-        <mc:AlternateContent xmlns:mc="http://schemas.openxmlformats.org/markup-compatibility/2006">
-          <mc:Choice xmlns:p14="http://schemas.microsoft.com/office/powerpoint/2010/main" Requires="p14">
+        <mc:AlternateContent xmlns:mc="http://schemas.openxmlformats.org/markup-compatibility/2006" xmlns:p14="http://schemas.microsoft.com/office/powerpoint/2010/main">
+          <mc:Choice Requires="p14">
             <p:contentPart p14:bwMode="auto" r:id="rId47">
               <p14:nvContentPartPr>
                 <p14:cNvPr id="38" name="墨迹 37">
@@ -8481,7 +8757,7 @@
               </p14:xfrm>
             </p:contentPart>
           </mc:Choice>
-          <mc:Fallback>
+          <mc:Fallback xmlns="">
             <p:pic>
               <p:nvPicPr>
                 <p:cNvPr id="38" name="墨迹 37">
@@ -8512,8 +8788,8 @@
             </p:pic>
           </mc:Fallback>
         </mc:AlternateContent>
-        <mc:AlternateContent xmlns:mc="http://schemas.openxmlformats.org/markup-compatibility/2006">
-          <mc:Choice xmlns:p14="http://schemas.microsoft.com/office/powerpoint/2010/main" Requires="p14">
+        <mc:AlternateContent xmlns:mc="http://schemas.openxmlformats.org/markup-compatibility/2006" xmlns:p14="http://schemas.microsoft.com/office/powerpoint/2010/main">
+          <mc:Choice Requires="p14">
             <p:contentPart p14:bwMode="auto" r:id="rId49">
               <p14:nvContentPartPr>
                 <p14:cNvPr id="40" name="墨迹 39">
@@ -8532,7 +8808,7 @@
               </p14:xfrm>
             </p:contentPart>
           </mc:Choice>
-          <mc:Fallback>
+          <mc:Fallback xmlns="">
             <p:pic>
               <p:nvPicPr>
                 <p:cNvPr id="40" name="墨迹 39">
@@ -8584,8 +8860,8 @@
             <a:chExt cx="137160" cy="132840"/>
           </a:xfrm>
         </p:grpSpPr>
-        <mc:AlternateContent xmlns:mc="http://schemas.openxmlformats.org/markup-compatibility/2006">
-          <mc:Choice xmlns:p14="http://schemas.microsoft.com/office/powerpoint/2010/main" Requires="p14">
+        <mc:AlternateContent xmlns:mc="http://schemas.openxmlformats.org/markup-compatibility/2006" xmlns:p14="http://schemas.microsoft.com/office/powerpoint/2010/main">
+          <mc:Choice Requires="p14">
             <p:contentPart p14:bwMode="auto" r:id="rId51">
               <p14:nvContentPartPr>
                 <p14:cNvPr id="42" name="墨迹 41">
@@ -8604,7 +8880,7 @@
               </p14:xfrm>
             </p:contentPart>
           </mc:Choice>
-          <mc:Fallback>
+          <mc:Fallback xmlns="">
             <p:pic>
               <p:nvPicPr>
                 <p:cNvPr id="42" name="墨迹 41">
@@ -8635,8 +8911,8 @@
             </p:pic>
           </mc:Fallback>
         </mc:AlternateContent>
-        <mc:AlternateContent xmlns:mc="http://schemas.openxmlformats.org/markup-compatibility/2006">
-          <mc:Choice xmlns:p14="http://schemas.microsoft.com/office/powerpoint/2010/main" Requires="p14">
+        <mc:AlternateContent xmlns:mc="http://schemas.openxmlformats.org/markup-compatibility/2006" xmlns:p14="http://schemas.microsoft.com/office/powerpoint/2010/main">
+          <mc:Choice Requires="p14">
             <p:contentPart p14:bwMode="auto" r:id="rId53">
               <p14:nvContentPartPr>
                 <p14:cNvPr id="43" name="墨迹 42">
@@ -8655,7 +8931,7 @@
               </p14:xfrm>
             </p:contentPart>
           </mc:Choice>
-          <mc:Fallback>
+          <mc:Fallback xmlns="">
             <p:pic>
               <p:nvPicPr>
                 <p:cNvPr id="43" name="墨迹 42">
@@ -8687,8 +8963,8 @@
           </mc:Fallback>
         </mc:AlternateContent>
       </p:grpSp>
-      <mc:AlternateContent xmlns:mc="http://schemas.openxmlformats.org/markup-compatibility/2006">
-        <mc:Choice xmlns:p14="http://schemas.microsoft.com/office/powerpoint/2010/main" Requires="p14">
+      <mc:AlternateContent xmlns:mc="http://schemas.openxmlformats.org/markup-compatibility/2006" xmlns:p14="http://schemas.microsoft.com/office/powerpoint/2010/main">
+        <mc:Choice Requires="p14">
           <p:contentPart p14:bwMode="auto" r:id="rId55">
             <p14:nvContentPartPr>
               <p14:cNvPr id="45" name="墨迹 44">
@@ -8707,7 +8983,7 @@
             </p14:xfrm>
           </p:contentPart>
         </mc:Choice>
-        <mc:Fallback>
+        <mc:Fallback xmlns="">
           <p:pic>
             <p:nvPicPr>
               <p:cNvPr id="45" name="墨迹 44">

</xml_diff>